<commit_message>
CppunitTest_sd_import_tests-smartart: make testAutofitSync more robust
- replace 'Calibri Light' with 'Noto Sans' (we bundle the later)
- replace 'Calibri' with 'Arial'

With this:

	diff --git a/sd/CppunitTest_sd_import_tests-smartart.mk b/sd/CppunitTest_sd_import_tests-smartart.mk
	index 9b7362b08152..72e0dead7731 100644
	--- a/sd/CppunitTest_sd_import_tests-smartart.mk
	+++ b/sd/CppunitTest_sd_import_tests-smartart.mk
	@@ -11,4 +11,6 @@

	 $(eval $(call sd_import_test,-smartart))

	+$(eval $(call gb_CppunitTest_set_non_application_font_use,sd_import_tests-smartart,abort))
	+
	 # vim: set noet sw=4 ts=4:

doesn't abort anymore. In fact the second replacement is just for
completeness, the first was enough alredy.

Change-Id: I455b473233e351b7a2ee6a1b1b66049e63a8a6ff
Reviewed-on: https://gerrit.libreoffice.org/c/core/+/158263
Tested-by: Jenkins
Reviewed-by: Miklos Vajna <vmiklos@collabora.com>
</commit_message>
<xml_diff>
--- a/sd/qa/unit/data/pptx/smartart-autofit-sync.pptx
+++ b/sd/qa/unit/data/pptx/smartart-autofit-sync.pptx
@@ -6647,7 +6647,7 @@
     </a:clrScheme>
     <a:fontScheme name="Office">
       <a:majorFont>
-        <a:latin typeface="Calibri Light" panose="020F0302020204030204"/>
+        <a:latin typeface="Noto Sans" panose="020F0302020204030204"/>
         <a:ea typeface=""/>
         <a:cs typeface=""/>
         <a:font script="Jpan" typeface="游ゴシック Light"/>
@@ -6699,7 +6699,7 @@
         <a:font script="Tfng" typeface="Ebrima"/>
       </a:majorFont>
       <a:minorFont>
-        <a:latin typeface="Calibri" panose="020F0502020204030204"/>
+        <a:latin typeface="Arial" panose="020F0502020204030204"/>
         <a:ea typeface=""/>
         <a:cs typeface=""/>
         <a:font script="Jpan" typeface="游ゴシック"/>

</xml_diff>